<commit_message>
Fixed spelling mistake ... :-)
</commit_message>
<xml_diff>
--- a/Demo 1.pptx
+++ b/Demo 1.pptx
@@ -112,7 +112,7 @@
   </p:defaultTextStyle>
   <p:extLst>
     <p:ext uri="{EFAFB233-063F-42B5-8137-9DF3F51BA10A}">
-      <p15:sldGuideLst xmlns:p15="http://schemas.microsoft.com/office/powerpoint/2012/main">
+      <p15:sldGuideLst xmlns:p15="http://schemas.microsoft.com/office/powerpoint/2012/main" xmlns="">
         <p15:guide id="1" orient="horz" pos="2160">
           <p15:clr>
             <a:srgbClr val="A4A3A4"/>
@@ -305,7 +305,7 @@
             <a:fld id="{641F762E-6945-44E4-9C44-76FEE8DB52DC}" type="datetimeFigureOut">
               <a:rPr lang="en-US" smtClean="0"/>
               <a:pPr/>
-              <a:t>5/21/2015</a:t>
+              <a:t>5/22/2015</a:t>
             </a:fld>
             <a:endParaRPr lang="en-US"/>
           </a:p>
@@ -477,7 +477,7 @@
             <a:fld id="{641F762E-6945-44E4-9C44-76FEE8DB52DC}" type="datetimeFigureOut">
               <a:rPr lang="en-US" smtClean="0"/>
               <a:pPr/>
-              <a:t>5/21/2015</a:t>
+              <a:t>5/22/2015</a:t>
             </a:fld>
             <a:endParaRPr lang="en-US"/>
           </a:p>
@@ -654,7 +654,7 @@
             <a:fld id="{641F762E-6945-44E4-9C44-76FEE8DB52DC}" type="datetimeFigureOut">
               <a:rPr lang="en-US" smtClean="0"/>
               <a:pPr/>
-              <a:t>5/21/2015</a:t>
+              <a:t>5/22/2015</a:t>
             </a:fld>
             <a:endParaRPr lang="en-US"/>
           </a:p>
@@ -821,7 +821,7 @@
             <a:fld id="{641F762E-6945-44E4-9C44-76FEE8DB52DC}" type="datetimeFigureOut">
               <a:rPr lang="en-US" smtClean="0"/>
               <a:pPr/>
-              <a:t>5/21/2015</a:t>
+              <a:t>5/22/2015</a:t>
             </a:fld>
             <a:endParaRPr lang="en-US"/>
           </a:p>
@@ -1057,7 +1057,7 @@
             <a:fld id="{641F762E-6945-44E4-9C44-76FEE8DB52DC}" type="datetimeFigureOut">
               <a:rPr lang="en-US" smtClean="0"/>
               <a:pPr/>
-              <a:t>5/21/2015</a:t>
+              <a:t>5/22/2015</a:t>
             </a:fld>
             <a:endParaRPr lang="en-US"/>
           </a:p>
@@ -1355,7 +1355,7 @@
             <a:fld id="{641F762E-6945-44E4-9C44-76FEE8DB52DC}" type="datetimeFigureOut">
               <a:rPr lang="en-US" smtClean="0"/>
               <a:pPr/>
-              <a:t>5/21/2015</a:t>
+              <a:t>5/22/2015</a:t>
             </a:fld>
             <a:endParaRPr lang="en-US"/>
           </a:p>
@@ -1741,7 +1741,7 @@
             <a:fld id="{641F762E-6945-44E4-9C44-76FEE8DB52DC}" type="datetimeFigureOut">
               <a:rPr lang="en-US" smtClean="0"/>
               <a:pPr/>
-              <a:t>5/21/2015</a:t>
+              <a:t>5/22/2015</a:t>
             </a:fld>
             <a:endParaRPr lang="en-US"/>
           </a:p>
@@ -1916,7 +1916,7 @@
             <a:fld id="{641F762E-6945-44E4-9C44-76FEE8DB52DC}" type="datetimeFigureOut">
               <a:rPr lang="en-US" smtClean="0"/>
               <a:pPr/>
-              <a:t>5/21/2015</a:t>
+              <a:t>5/22/2015</a:t>
             </a:fld>
             <a:endParaRPr lang="en-US"/>
           </a:p>
@@ -2008,7 +2008,7 @@
             <a:fld id="{641F762E-6945-44E4-9C44-76FEE8DB52DC}" type="datetimeFigureOut">
               <a:rPr lang="en-US" smtClean="0"/>
               <a:pPr/>
-              <a:t>5/21/2015</a:t>
+              <a:t>5/22/2015</a:t>
             </a:fld>
             <a:endParaRPr lang="en-US"/>
           </a:p>
@@ -2305,7 +2305,7 @@
             <a:fld id="{641F762E-6945-44E4-9C44-76FEE8DB52DC}" type="datetimeFigureOut">
               <a:rPr lang="en-US" smtClean="0"/>
               <a:pPr/>
-              <a:t>5/21/2015</a:t>
+              <a:t>5/22/2015</a:t>
             </a:fld>
             <a:endParaRPr lang="en-US"/>
           </a:p>
@@ -2441,7 +2441,7 @@
             <a:fld id="{641F762E-6945-44E4-9C44-76FEE8DB52DC}" type="datetimeFigureOut">
               <a:rPr lang="en-US" smtClean="0"/>
               <a:pPr/>
-              <a:t>5/21/2015</a:t>
+              <a:t>5/22/2015</a:t>
             </a:fld>
             <a:endParaRPr lang="en-US"/>
           </a:p>
@@ -2746,7 +2746,7 @@
             <a:fld id="{641F762E-6945-44E4-9C44-76FEE8DB52DC}" type="datetimeFigureOut">
               <a:rPr lang="en-US" smtClean="0"/>
               <a:pPr/>
-              <a:t>5/21/2015</a:t>
+              <a:t>5/22/2015</a:t>
             </a:fld>
             <a:endParaRPr lang="en-US"/>
           </a:p>
@@ -3571,6 +3571,13 @@
   <p:clrMapOvr>
     <a:masterClrMapping/>
   </p:clrMapOvr>
+  <p:timing>
+    <p:tnLst>
+      <p:par>
+        <p:cTn id="1" dur="indefinite" restart="never" nodeType="tmRoot"/>
+      </p:par>
+    </p:tnLst>
+  </p:timing>
 </p:sld>
 </file>
 
@@ -3832,6 +3839,13 @@
   <p:clrMapOvr>
     <a:masterClrMapping/>
   </p:clrMapOvr>
+  <p:timing>
+    <p:tnLst>
+      <p:par>
+        <p:cTn id="1" dur="indefinite" restart="never" nodeType="tmRoot"/>
+      </p:par>
+    </p:tnLst>
+  </p:timing>
 </p:sld>
 </file>
 
@@ -4050,8 +4064,11 @@
               <a:rPr lang="en-US" sz="2800" b="1" dirty="0" smtClean="0">
                 <a:latin typeface="+mj-lt"/>
               </a:rPr>
-              <a:t>Casher </a:t>
-            </a:r>
+              <a:t>Cashier </a:t>
+            </a:r>
+            <a:endParaRPr lang="en-US" sz="2800" b="1" dirty="0" smtClean="0">
+              <a:latin typeface="+mj-lt"/>
+            </a:endParaRPr>
           </a:p>
           <a:p>
             <a:pPr lvl="1">
@@ -4109,6 +4126,13 @@
   <p:clrMapOvr>
     <a:masterClrMapping/>
   </p:clrMapOvr>
+  <p:timing>
+    <p:tnLst>
+      <p:par>
+        <p:cTn id="1" dur="indefinite" restart="never" nodeType="tmRoot"/>
+      </p:par>
+    </p:tnLst>
+  </p:timing>
 </p:sld>
 </file>
 
@@ -4326,6 +4350,13 @@
   <p:clrMapOvr>
     <a:masterClrMapping/>
   </p:clrMapOvr>
+  <p:timing>
+    <p:tnLst>
+      <p:par>
+        <p:cTn id="1" dur="indefinite" restart="never" nodeType="tmRoot"/>
+      </p:par>
+    </p:tnLst>
+  </p:timing>
 </p:sld>
 </file>
 
@@ -4370,7 +4401,7 @@
           <a:p>
             <a:pPr algn="ctr"/>
             <a:r>
-              <a:rPr lang="en-US" sz="4800" b="1" dirty="0" err="1" smtClean="0">
+              <a:rPr lang="en-US" sz="4800" b="1" dirty="0" smtClean="0">
                 <a:solidFill>
                   <a:srgbClr val="4D4D4D"/>
                 </a:solidFill>
@@ -4383,7 +4414,7 @@
                 </a:effectLst>
                 <a:latin typeface="+mj-lt"/>
               </a:rPr>
-              <a:t>Thecnologies</a:t>
+              <a:t>Technologies</a:t>
             </a:r>
             <a:endParaRPr lang="en-US" sz="4800" b="1" dirty="0" smtClean="0">
               <a:solidFill>
@@ -4555,15 +4586,7 @@
             </a:r>
             <a:r>
               <a:rPr lang="en-US" sz="3200" dirty="0" smtClean="0"/>
-              <a:t>   </a:t>
-            </a:r>
-            <a:r>
-              <a:rPr lang="en-US" sz="3200" smtClean="0"/>
-              <a:t>application for </a:t>
-            </a:r>
-            <a:r>
-              <a:rPr lang="en-US" sz="3200" dirty="0" smtClean="0"/>
-              <a:t>multiple  platforms  </a:t>
+              <a:t>   application for multiple  platforms  </a:t>
             </a:r>
           </a:p>
           <a:p>
@@ -4631,7 +4654,11 @@
           <a:p>
             <a:r>
               <a:rPr lang="en-GB" dirty="0" smtClean="0"/>
-              <a:t>CMS use case</a:t>
+              <a:t>CMS </a:t>
+            </a:r>
+            <a:r>
+              <a:rPr lang="en-GB" dirty="0" smtClean="0"/>
+              <a:t>use case</a:t>
             </a:r>
             <a:endParaRPr lang="en-GB" dirty="0"/>
           </a:p>
@@ -4648,10 +4675,10 @@
           </p:nvPr>
         </p:nvPicPr>
         <p:blipFill>
-          <a:blip r:embed="rId2">
+          <a:blip r:embed="rId2" cstate="print">
             <a:extLst>
               <a:ext uri="{28A0092B-C50C-407E-A947-70E740481C1C}">
-                <a14:useLocalDpi xmlns:a14="http://schemas.microsoft.com/office/drawing/2010/main" val="0"/>
+                <a14:useLocalDpi xmlns:a14="http://schemas.microsoft.com/office/drawing/2010/main" xmlns="" val="0"/>
               </a:ext>
             </a:extLst>
           </a:blip>
@@ -4669,7 +4696,7 @@
     </p:spTree>
     <p:extLst>
       <p:ext uri="{BB962C8B-B14F-4D97-AF65-F5344CB8AC3E}">
-        <p14:creationId xmlns:p14="http://schemas.microsoft.com/office/powerpoint/2010/main" val="3911823680"/>
+        <p14:creationId xmlns:p14="http://schemas.microsoft.com/office/powerpoint/2010/main" xmlns="" val="3911823680"/>
       </p:ext>
     </p:extLst>
   </p:cSld>
@@ -4737,10 +4764,10 @@
           </p:nvPr>
         </p:nvPicPr>
         <p:blipFill>
-          <a:blip r:embed="rId2">
+          <a:blip r:embed="rId2" cstate="print">
             <a:extLst>
               <a:ext uri="{28A0092B-C50C-407E-A947-70E740481C1C}">
-                <a14:useLocalDpi xmlns:a14="http://schemas.microsoft.com/office/drawing/2010/main" val="0"/>
+                <a14:useLocalDpi xmlns:a14="http://schemas.microsoft.com/office/drawing/2010/main" xmlns="" val="0"/>
               </a:ext>
             </a:extLst>
           </a:blip>
@@ -4758,7 +4785,7 @@
     </p:spTree>
     <p:extLst>
       <p:ext uri="{BB962C8B-B14F-4D97-AF65-F5344CB8AC3E}">
-        <p14:creationId xmlns:p14="http://schemas.microsoft.com/office/powerpoint/2010/main" val="3782763740"/>
+        <p14:creationId xmlns:p14="http://schemas.microsoft.com/office/powerpoint/2010/main" xmlns="" val="3782763740"/>
       </p:ext>
     </p:extLst>
   </p:cSld>

</xml_diff>

<commit_message>
Added diagrams to demo slides
</commit_message>
<xml_diff>
--- a/Demo 1.pptx
+++ b/Demo 1.pptx
@@ -11,7 +11,13 @@
     <p:sldId id="261" r:id="rId5"/>
     <p:sldId id="263" r:id="rId6"/>
     <p:sldId id="264" r:id="rId7"/>
-    <p:sldId id="265" r:id="rId8"/>
+    <p:sldId id="269" r:id="rId8"/>
+    <p:sldId id="270" r:id="rId9"/>
+    <p:sldId id="265" r:id="rId10"/>
+    <p:sldId id="271" r:id="rId11"/>
+    <p:sldId id="266" r:id="rId12"/>
+    <p:sldId id="267" r:id="rId13"/>
+    <p:sldId id="268" r:id="rId14"/>
   </p:sldIdLst>
   <p:sldSz cx="9144000" cy="6858000" type="screen4x3"/>
   <p:notesSz cx="6858000" cy="9144000"/>
@@ -112,7 +118,7 @@
   </p:defaultTextStyle>
   <p:extLst>
     <p:ext uri="{EFAFB233-063F-42B5-8137-9DF3F51BA10A}">
-      <p15:sldGuideLst xmlns:p15="http://schemas.microsoft.com/office/powerpoint/2012/main" xmlns="">
+      <p15:sldGuideLst xmlns="" xmlns:p15="http://schemas.microsoft.com/office/powerpoint/2012/main">
         <p15:guide id="1" orient="horz" pos="2160">
           <p15:clr>
             <a:srgbClr val="A4A3A4"/>
@@ -3581,6 +3587,411 @@
 </p:sld>
 </file>
 
+<file path=ppt/slides/slide10.xml><?xml version="1.0" encoding="utf-8"?>
+<p:sld xmlns:a="http://schemas.openxmlformats.org/drawingml/2006/main" xmlns:r="http://schemas.openxmlformats.org/officeDocument/2006/relationships" xmlns:p="http://schemas.openxmlformats.org/presentationml/2006/main">
+  <p:cSld>
+    <p:spTree>
+      <p:nvGrpSpPr>
+        <p:cNvPr id="1" name=""/>
+        <p:cNvGrpSpPr/>
+        <p:nvPr/>
+      </p:nvGrpSpPr>
+      <p:grpSpPr>
+        <a:xfrm>
+          <a:off x="0" y="0"/>
+          <a:ext cx="0" cy="0"/>
+          <a:chOff x="0" y="0"/>
+          <a:chExt cx="0" cy="0"/>
+        </a:xfrm>
+      </p:grpSpPr>
+      <p:sp>
+        <p:nvSpPr>
+          <p:cNvPr id="2" name="Title 1"/>
+          <p:cNvSpPr>
+            <a:spLocks noGrp="1"/>
+          </p:cNvSpPr>
+          <p:nvPr>
+            <p:ph type="title"/>
+          </p:nvPr>
+        </p:nvSpPr>
+        <p:spPr/>
+        <p:txBody>
+          <a:bodyPr/>
+          <a:lstStyle/>
+          <a:p>
+            <a:r>
+              <a:rPr lang="en-GB" dirty="0" smtClean="0"/>
+              <a:t>EDIT PROFILE activity </a:t>
+            </a:r>
+            <a:r>
+              <a:rPr lang="en-GB" dirty="0" smtClean="0"/>
+              <a:t>diagram</a:t>
+            </a:r>
+            <a:endParaRPr lang="en-GB" dirty="0"/>
+          </a:p>
+        </p:txBody>
+      </p:sp>
+      <p:pic>
+        <p:nvPicPr>
+          <p:cNvPr id="6146" name="Picture 2" descr="C:\Users\Bella\Desktop\MainProject\Demo1\Diagrams\Process Diagrams\EditProfileRequest.png"/>
+          <p:cNvPicPr>
+            <a:picLocks noChangeAspect="1" noChangeArrowheads="1"/>
+          </p:cNvPicPr>
+          <p:nvPr/>
+        </p:nvPicPr>
+        <p:blipFill>
+          <a:blip r:embed="rId2" cstate="print"/>
+          <a:srcRect/>
+          <a:stretch>
+            <a:fillRect/>
+          </a:stretch>
+        </p:blipFill>
+        <p:spPr bwMode="auto">
+          <a:xfrm>
+            <a:off x="304800" y="1447800"/>
+            <a:ext cx="8067676" cy="4743450"/>
+          </a:xfrm>
+          <a:prstGeom prst="rect">
+            <a:avLst/>
+          </a:prstGeom>
+          <a:noFill/>
+        </p:spPr>
+      </p:pic>
+    </p:spTree>
+    <p:extLst>
+      <p:ext uri="{BB962C8B-B14F-4D97-AF65-F5344CB8AC3E}">
+        <p14:creationId xmlns="" xmlns:p14="http://schemas.microsoft.com/office/powerpoint/2010/main" val="3782763740"/>
+      </p:ext>
+    </p:extLst>
+  </p:cSld>
+  <p:clrMapOvr>
+    <a:masterClrMapping/>
+  </p:clrMapOvr>
+  <p:timing>
+    <p:tnLst>
+      <p:par>
+        <p:cTn id="1" dur="indefinite" restart="never" nodeType="tmRoot"/>
+      </p:par>
+    </p:tnLst>
+  </p:timing>
+</p:sld>
+</file>
+
+<file path=ppt/slides/slide11.xml><?xml version="1.0" encoding="utf-8"?>
+<p:sld xmlns:a="http://schemas.openxmlformats.org/drawingml/2006/main" xmlns:r="http://schemas.openxmlformats.org/officeDocument/2006/relationships" xmlns:p="http://schemas.openxmlformats.org/presentationml/2006/main">
+  <p:cSld>
+    <p:spTree>
+      <p:nvGrpSpPr>
+        <p:cNvPr id="1" name=""/>
+        <p:cNvGrpSpPr/>
+        <p:nvPr/>
+      </p:nvGrpSpPr>
+      <p:grpSpPr>
+        <a:xfrm>
+          <a:off x="0" y="0"/>
+          <a:ext cx="0" cy="0"/>
+          <a:chOff x="0" y="0"/>
+          <a:chExt cx="0" cy="0"/>
+        </a:xfrm>
+      </p:grpSpPr>
+      <p:sp>
+        <p:nvSpPr>
+          <p:cNvPr id="2" name="Title 1"/>
+          <p:cNvSpPr>
+            <a:spLocks noGrp="1"/>
+          </p:cNvSpPr>
+          <p:nvPr>
+            <p:ph type="title"/>
+          </p:nvPr>
+        </p:nvSpPr>
+        <p:spPr/>
+        <p:txBody>
+          <a:bodyPr/>
+          <a:lstStyle/>
+          <a:p>
+            <a:r>
+              <a:rPr lang="en-GB" dirty="0" smtClean="0"/>
+              <a:t>Service contract – add daily special</a:t>
+            </a:r>
+            <a:endParaRPr lang="en-GB" dirty="0"/>
+          </a:p>
+        </p:txBody>
+      </p:sp>
+      <p:sp>
+        <p:nvSpPr>
+          <p:cNvPr id="4" name="Content Placeholder 3"/>
+          <p:cNvSpPr>
+            <a:spLocks noGrp="1"/>
+          </p:cNvSpPr>
+          <p:nvPr>
+            <p:ph sz="half" idx="1"/>
+          </p:nvPr>
+        </p:nvSpPr>
+        <p:spPr/>
+        <p:txBody>
+          <a:bodyPr/>
+          <a:lstStyle/>
+          <a:p>
+            <a:endParaRPr lang="en-US"/>
+          </a:p>
+        </p:txBody>
+      </p:sp>
+      <p:pic>
+        <p:nvPicPr>
+          <p:cNvPr id="1026" name="Picture 2" descr="C:\Users\Bella\Desktop\MainProject\Demo1\Diagrams\Service Contracts\addDailySpecial.jpg"/>
+          <p:cNvPicPr>
+            <a:picLocks noChangeAspect="1" noChangeArrowheads="1"/>
+          </p:cNvPicPr>
+          <p:nvPr/>
+        </p:nvPicPr>
+        <p:blipFill>
+          <a:blip r:embed="rId2" cstate="print"/>
+          <a:srcRect/>
+          <a:stretch>
+            <a:fillRect/>
+          </a:stretch>
+        </p:blipFill>
+        <p:spPr bwMode="auto">
+          <a:xfrm>
+            <a:off x="0" y="1524000"/>
+            <a:ext cx="9144000" cy="4916316"/>
+          </a:xfrm>
+          <a:prstGeom prst="rect">
+            <a:avLst/>
+          </a:prstGeom>
+          <a:noFill/>
+        </p:spPr>
+      </p:pic>
+    </p:spTree>
+    <p:extLst>
+      <p:ext uri="{BB962C8B-B14F-4D97-AF65-F5344CB8AC3E}">
+        <p14:creationId xmlns="" xmlns:p14="http://schemas.microsoft.com/office/powerpoint/2010/main" val="3782763740"/>
+      </p:ext>
+    </p:extLst>
+  </p:cSld>
+  <p:clrMapOvr>
+    <a:masterClrMapping/>
+  </p:clrMapOvr>
+  <p:timing>
+    <p:tnLst>
+      <p:par>
+        <p:cTn id="1" dur="indefinite" restart="never" nodeType="tmRoot"/>
+      </p:par>
+    </p:tnLst>
+  </p:timing>
+</p:sld>
+</file>
+
+<file path=ppt/slides/slide12.xml><?xml version="1.0" encoding="utf-8"?>
+<p:sld xmlns:a="http://schemas.openxmlformats.org/drawingml/2006/main" xmlns:r="http://schemas.openxmlformats.org/officeDocument/2006/relationships" xmlns:p="http://schemas.openxmlformats.org/presentationml/2006/main">
+  <p:cSld>
+    <p:spTree>
+      <p:nvGrpSpPr>
+        <p:cNvPr id="1" name=""/>
+        <p:cNvGrpSpPr/>
+        <p:nvPr/>
+      </p:nvGrpSpPr>
+      <p:grpSpPr>
+        <a:xfrm>
+          <a:off x="0" y="0"/>
+          <a:ext cx="0" cy="0"/>
+          <a:chOff x="0" y="0"/>
+          <a:chExt cx="0" cy="0"/>
+        </a:xfrm>
+      </p:grpSpPr>
+      <p:sp>
+        <p:nvSpPr>
+          <p:cNvPr id="2" name="Title 1"/>
+          <p:cNvSpPr>
+            <a:spLocks noGrp="1"/>
+          </p:cNvSpPr>
+          <p:nvPr>
+            <p:ph type="title"/>
+          </p:nvPr>
+        </p:nvSpPr>
+        <p:spPr/>
+        <p:txBody>
+          <a:bodyPr/>
+          <a:lstStyle/>
+          <a:p>
+            <a:r>
+              <a:rPr lang="en-GB" dirty="0" smtClean="0"/>
+              <a:t>Service contract – Change logo</a:t>
+            </a:r>
+            <a:endParaRPr lang="en-GB" dirty="0"/>
+          </a:p>
+        </p:txBody>
+      </p:sp>
+      <p:sp>
+        <p:nvSpPr>
+          <p:cNvPr id="4" name="Content Placeholder 3"/>
+          <p:cNvSpPr>
+            <a:spLocks noGrp="1"/>
+          </p:cNvSpPr>
+          <p:nvPr>
+            <p:ph sz="half" idx="1"/>
+          </p:nvPr>
+        </p:nvSpPr>
+        <p:spPr/>
+        <p:txBody>
+          <a:bodyPr/>
+          <a:lstStyle/>
+          <a:p>
+            <a:endParaRPr lang="en-US"/>
+          </a:p>
+        </p:txBody>
+      </p:sp>
+      <p:pic>
+        <p:nvPicPr>
+          <p:cNvPr id="2050" name="Picture 2" descr="C:\Users\Bella\Desktop\MainProject\Demo1\Diagrams\Service Contracts\changeLogo.jpg"/>
+          <p:cNvPicPr>
+            <a:picLocks noChangeAspect="1" noChangeArrowheads="1"/>
+          </p:cNvPicPr>
+          <p:nvPr/>
+        </p:nvPicPr>
+        <p:blipFill>
+          <a:blip r:embed="rId2" cstate="print"/>
+          <a:srcRect/>
+          <a:stretch>
+            <a:fillRect/>
+          </a:stretch>
+        </p:blipFill>
+        <p:spPr bwMode="auto">
+          <a:xfrm>
+            <a:off x="228600" y="1371600"/>
+            <a:ext cx="8401050" cy="4905375"/>
+          </a:xfrm>
+          <a:prstGeom prst="rect">
+            <a:avLst/>
+          </a:prstGeom>
+          <a:noFill/>
+        </p:spPr>
+      </p:pic>
+    </p:spTree>
+    <p:extLst>
+      <p:ext uri="{BB962C8B-B14F-4D97-AF65-F5344CB8AC3E}">
+        <p14:creationId xmlns="" xmlns:p14="http://schemas.microsoft.com/office/powerpoint/2010/main" val="3782763740"/>
+      </p:ext>
+    </p:extLst>
+  </p:cSld>
+  <p:clrMapOvr>
+    <a:masterClrMapping/>
+  </p:clrMapOvr>
+  <p:timing>
+    <p:tnLst>
+      <p:par>
+        <p:cTn id="1" dur="indefinite" restart="never" nodeType="tmRoot"/>
+      </p:par>
+    </p:tnLst>
+  </p:timing>
+</p:sld>
+</file>
+
+<file path=ppt/slides/slide13.xml><?xml version="1.0" encoding="utf-8"?>
+<p:sld xmlns:a="http://schemas.openxmlformats.org/drawingml/2006/main" xmlns:r="http://schemas.openxmlformats.org/officeDocument/2006/relationships" xmlns:p="http://schemas.openxmlformats.org/presentationml/2006/main">
+  <p:cSld>
+    <p:spTree>
+      <p:nvGrpSpPr>
+        <p:cNvPr id="1" name=""/>
+        <p:cNvGrpSpPr/>
+        <p:nvPr/>
+      </p:nvGrpSpPr>
+      <p:grpSpPr>
+        <a:xfrm>
+          <a:off x="0" y="0"/>
+          <a:ext cx="0" cy="0"/>
+          <a:chOff x="0" y="0"/>
+          <a:chExt cx="0" cy="0"/>
+        </a:xfrm>
+      </p:grpSpPr>
+      <p:sp>
+        <p:nvSpPr>
+          <p:cNvPr id="2" name="Title 1"/>
+          <p:cNvSpPr>
+            <a:spLocks noGrp="1"/>
+          </p:cNvSpPr>
+          <p:nvPr>
+            <p:ph type="title"/>
+          </p:nvPr>
+        </p:nvSpPr>
+        <p:spPr/>
+        <p:txBody>
+          <a:bodyPr/>
+          <a:lstStyle/>
+          <a:p>
+            <a:r>
+              <a:rPr lang="en-GB" dirty="0" smtClean="0"/>
+              <a:t>Service contract – Increment stock</a:t>
+            </a:r>
+            <a:endParaRPr lang="en-GB" dirty="0"/>
+          </a:p>
+        </p:txBody>
+      </p:sp>
+      <p:sp>
+        <p:nvSpPr>
+          <p:cNvPr id="4" name="Content Placeholder 3"/>
+          <p:cNvSpPr>
+            <a:spLocks noGrp="1"/>
+          </p:cNvSpPr>
+          <p:nvPr>
+            <p:ph sz="half" idx="1"/>
+          </p:nvPr>
+        </p:nvSpPr>
+        <p:spPr/>
+        <p:txBody>
+          <a:bodyPr/>
+          <a:lstStyle/>
+          <a:p>
+            <a:endParaRPr lang="en-US"/>
+          </a:p>
+        </p:txBody>
+      </p:sp>
+      <p:pic>
+        <p:nvPicPr>
+          <p:cNvPr id="3074" name="Picture 2" descr="C:\Users\Bella\Desktop\MainProject\Demo1\Diagrams\Service Contracts\incrementStockAdded.jpg"/>
+          <p:cNvPicPr>
+            <a:picLocks noChangeAspect="1" noChangeArrowheads="1"/>
+          </p:cNvPicPr>
+          <p:nvPr/>
+        </p:nvPicPr>
+        <p:blipFill>
+          <a:blip r:embed="rId2" cstate="print"/>
+          <a:srcRect/>
+          <a:stretch>
+            <a:fillRect/>
+          </a:stretch>
+        </p:blipFill>
+        <p:spPr bwMode="auto">
+          <a:xfrm>
+            <a:off x="0" y="1524000"/>
+            <a:ext cx="9172836" cy="4448175"/>
+          </a:xfrm>
+          <a:prstGeom prst="rect">
+            <a:avLst/>
+          </a:prstGeom>
+          <a:noFill/>
+        </p:spPr>
+      </p:pic>
+    </p:spTree>
+    <p:extLst>
+      <p:ext uri="{BB962C8B-B14F-4D97-AF65-F5344CB8AC3E}">
+        <p14:creationId xmlns="" xmlns:p14="http://schemas.microsoft.com/office/powerpoint/2010/main" val="3782763740"/>
+      </p:ext>
+    </p:extLst>
+  </p:cSld>
+  <p:clrMapOvr>
+    <a:masterClrMapping/>
+  </p:clrMapOvr>
+  <p:timing>
+    <p:tnLst>
+      <p:par>
+        <p:cTn id="1" dur="indefinite" restart="never" nodeType="tmRoot"/>
+      </p:par>
+    </p:tnLst>
+  </p:timing>
+</p:sld>
+</file>
+
 <file path=ppt/slides/slide2.xml><?xml version="1.0" encoding="utf-8"?>
 <p:sld xmlns:a="http://schemas.openxmlformats.org/drawingml/2006/main" xmlns:r="http://schemas.openxmlformats.org/officeDocument/2006/relationships" xmlns:p="http://schemas.openxmlformats.org/presentationml/2006/main">
   <p:cSld>
@@ -4066,9 +4477,6 @@
               </a:rPr>
               <a:t>Cashier </a:t>
             </a:r>
-            <a:endParaRPr lang="en-US" sz="2800" b="1" dirty="0" smtClean="0">
-              <a:latin typeface="+mj-lt"/>
-            </a:endParaRPr>
           </a:p>
           <a:p>
             <a:pPr lvl="1">
@@ -4416,19 +4824,6 @@
               </a:rPr>
               <a:t>Technologies</a:t>
             </a:r>
-            <a:endParaRPr lang="en-US" sz="4800" b="1" dirty="0" smtClean="0">
-              <a:solidFill>
-                <a:srgbClr val="4D4D4D"/>
-              </a:solidFill>
-              <a:effectLst>
-                <a:outerShdw blurRad="38100" dist="38100" dir="2700000" algn="tl">
-                  <a:srgbClr val="000000">
-                    <a:alpha val="43137"/>
-                  </a:srgbClr>
-                </a:outerShdw>
-              </a:effectLst>
-              <a:latin typeface="+mj-lt"/>
-            </a:endParaRPr>
           </a:p>
         </p:txBody>
       </p:sp>
@@ -4605,6 +5000,32 @@
           </a:p>
         </p:txBody>
       </p:sp>
+      <p:pic>
+        <p:nvPicPr>
+          <p:cNvPr id="7170" name="Picture 2" descr="C:\Users\Bella\Pictures\Screenshots\Screenshot (32).png"/>
+          <p:cNvPicPr>
+            <a:picLocks noChangeAspect="1" noChangeArrowheads="1"/>
+          </p:cNvPicPr>
+          <p:nvPr/>
+        </p:nvPicPr>
+        <p:blipFill>
+          <a:blip r:embed="rId2" cstate="print"/>
+          <a:srcRect l="1392" t="9375" r="65812" b="86461"/>
+          <a:stretch>
+            <a:fillRect/>
+          </a:stretch>
+        </p:blipFill>
+        <p:spPr bwMode="auto">
+          <a:xfrm>
+            <a:off x="4876800" y="2743200"/>
+            <a:ext cx="4267200" cy="304800"/>
+          </a:xfrm>
+          <a:prstGeom prst="rect">
+            <a:avLst/>
+          </a:prstGeom>
+          <a:noFill/>
+        </p:spPr>
+      </p:pic>
     </p:spTree>
   </p:cSld>
   <p:clrMapOvr>
@@ -4654,11 +5075,7 @@
           <a:p>
             <a:r>
               <a:rPr lang="en-GB" dirty="0" smtClean="0"/>
-              <a:t>CMS </a:t>
-            </a:r>
-            <a:r>
-              <a:rPr lang="en-GB" dirty="0" smtClean="0"/>
-              <a:t>use case</a:t>
+              <a:t>CMS use case</a:t>
             </a:r>
             <a:endParaRPr lang="en-GB" dirty="0"/>
           </a:p>
@@ -4678,7 +5095,7 @@
           <a:blip r:embed="rId2" cstate="print">
             <a:extLst>
               <a:ext uri="{28A0092B-C50C-407E-A947-70E740481C1C}">
-                <a14:useLocalDpi xmlns:a14="http://schemas.microsoft.com/office/drawing/2010/main" xmlns="" val="0"/>
+                <a14:useLocalDpi xmlns="" xmlns:a14="http://schemas.microsoft.com/office/drawing/2010/main" val="0"/>
               </a:ext>
             </a:extLst>
           </a:blip>
@@ -4696,7 +5113,7 @@
     </p:spTree>
     <p:extLst>
       <p:ext uri="{BB962C8B-B14F-4D97-AF65-F5344CB8AC3E}">
-        <p14:creationId xmlns:p14="http://schemas.microsoft.com/office/powerpoint/2010/main" xmlns="" val="3911823680"/>
+        <p14:creationId xmlns="" xmlns:p14="http://schemas.microsoft.com/office/powerpoint/2010/main" val="3911823680"/>
       </p:ext>
     </p:extLst>
   </p:cSld>
@@ -4747,6 +5164,197 @@
           <a:p>
             <a:r>
               <a:rPr lang="en-GB" dirty="0" smtClean="0"/>
+              <a:t>USE CASE - AUTHENTICATION</a:t>
+            </a:r>
+            <a:endParaRPr lang="en-GB" dirty="0"/>
+          </a:p>
+        </p:txBody>
+      </p:sp>
+      <p:sp>
+        <p:nvSpPr>
+          <p:cNvPr id="5" name="Content Placeholder 4"/>
+          <p:cNvSpPr>
+            <a:spLocks noGrp="1"/>
+          </p:cNvSpPr>
+          <p:nvPr>
+            <p:ph idx="1"/>
+          </p:nvPr>
+        </p:nvSpPr>
+        <p:spPr/>
+        <p:txBody>
+          <a:bodyPr/>
+          <a:lstStyle/>
+          <a:p>
+            <a:endParaRPr lang="en-US"/>
+          </a:p>
+        </p:txBody>
+      </p:sp>
+      <p:pic>
+        <p:nvPicPr>
+          <p:cNvPr id="4098" name="Picture 2" descr="C:\Users\Bella\Desktop\MainProject\Demo1\Diagrams\Use Case Diagrams\AuthenticationUseCase.png"/>
+          <p:cNvPicPr>
+            <a:picLocks noChangeAspect="1" noChangeArrowheads="1"/>
+          </p:cNvPicPr>
+          <p:nvPr/>
+        </p:nvPicPr>
+        <p:blipFill>
+          <a:blip r:embed="rId2" cstate="print"/>
+          <a:srcRect/>
+          <a:stretch>
+            <a:fillRect/>
+          </a:stretch>
+        </p:blipFill>
+        <p:spPr bwMode="auto">
+          <a:xfrm>
+            <a:off x="304800" y="1371600"/>
+            <a:ext cx="7962901" cy="4743450"/>
+          </a:xfrm>
+          <a:prstGeom prst="rect">
+            <a:avLst/>
+          </a:prstGeom>
+          <a:noFill/>
+        </p:spPr>
+      </p:pic>
+    </p:spTree>
+    <p:extLst>
+      <p:ext uri="{BB962C8B-B14F-4D97-AF65-F5344CB8AC3E}">
+        <p14:creationId xmlns="" xmlns:p14="http://schemas.microsoft.com/office/powerpoint/2010/main" val="3911823680"/>
+      </p:ext>
+    </p:extLst>
+  </p:cSld>
+  <p:clrMapOvr>
+    <a:masterClrMapping/>
+  </p:clrMapOvr>
+  <p:timing>
+    <p:tnLst>
+      <p:par>
+        <p:cTn id="1" dur="indefinite" restart="never" nodeType="tmRoot"/>
+      </p:par>
+    </p:tnLst>
+  </p:timing>
+</p:sld>
+</file>
+
+<file path=ppt/slides/slide8.xml><?xml version="1.0" encoding="utf-8"?>
+<p:sld xmlns:a="http://schemas.openxmlformats.org/drawingml/2006/main" xmlns:r="http://schemas.openxmlformats.org/officeDocument/2006/relationships" xmlns:p="http://schemas.openxmlformats.org/presentationml/2006/main">
+  <p:cSld>
+    <p:spTree>
+      <p:nvGrpSpPr>
+        <p:cNvPr id="1" name=""/>
+        <p:cNvGrpSpPr/>
+        <p:nvPr/>
+      </p:nvGrpSpPr>
+      <p:grpSpPr>
+        <a:xfrm>
+          <a:off x="0" y="0"/>
+          <a:ext cx="0" cy="0"/>
+          <a:chOff x="0" y="0"/>
+          <a:chExt cx="0" cy="0"/>
+        </a:xfrm>
+      </p:grpSpPr>
+      <p:sp>
+        <p:nvSpPr>
+          <p:cNvPr id="2" name="Title 1"/>
+          <p:cNvSpPr>
+            <a:spLocks noGrp="1"/>
+          </p:cNvSpPr>
+          <p:nvPr>
+            <p:ph type="title"/>
+          </p:nvPr>
+        </p:nvSpPr>
+        <p:spPr/>
+        <p:txBody>
+          <a:bodyPr/>
+          <a:lstStyle/>
+          <a:p>
+            <a:r>
+              <a:rPr lang="en-GB" dirty="0" smtClean="0"/>
+              <a:t>USE CASE - REGISTER</a:t>
+            </a:r>
+            <a:endParaRPr lang="en-GB" dirty="0"/>
+          </a:p>
+        </p:txBody>
+      </p:sp>
+      <p:pic>
+        <p:nvPicPr>
+          <p:cNvPr id="5122" name="Picture 2" descr="C:\Users\Bella\Desktop\MainProject\Demo1\Diagrams\Use Case Diagrams\RegisterUseCase.png"/>
+          <p:cNvPicPr>
+            <a:picLocks noChangeAspect="1" noChangeArrowheads="1"/>
+          </p:cNvPicPr>
+          <p:nvPr/>
+        </p:nvPicPr>
+        <p:blipFill>
+          <a:blip r:embed="rId2" cstate="print"/>
+          <a:srcRect/>
+          <a:stretch>
+            <a:fillRect/>
+          </a:stretch>
+        </p:blipFill>
+        <p:spPr bwMode="auto">
+          <a:xfrm>
+            <a:off x="457200" y="1524000"/>
+            <a:ext cx="8201025" cy="4743450"/>
+          </a:xfrm>
+          <a:prstGeom prst="rect">
+            <a:avLst/>
+          </a:prstGeom>
+          <a:noFill/>
+        </p:spPr>
+      </p:pic>
+    </p:spTree>
+    <p:extLst>
+      <p:ext uri="{BB962C8B-B14F-4D97-AF65-F5344CB8AC3E}">
+        <p14:creationId xmlns="" xmlns:p14="http://schemas.microsoft.com/office/powerpoint/2010/main" val="3911823680"/>
+      </p:ext>
+    </p:extLst>
+  </p:cSld>
+  <p:clrMapOvr>
+    <a:masterClrMapping/>
+  </p:clrMapOvr>
+  <p:timing>
+    <p:tnLst>
+      <p:par>
+        <p:cTn id="1" dur="indefinite" restart="never" nodeType="tmRoot"/>
+      </p:par>
+    </p:tnLst>
+  </p:timing>
+</p:sld>
+</file>
+
+<file path=ppt/slides/slide9.xml><?xml version="1.0" encoding="utf-8"?>
+<p:sld xmlns:a="http://schemas.openxmlformats.org/drawingml/2006/main" xmlns:r="http://schemas.openxmlformats.org/officeDocument/2006/relationships" xmlns:p="http://schemas.openxmlformats.org/presentationml/2006/main">
+  <p:cSld>
+    <p:spTree>
+      <p:nvGrpSpPr>
+        <p:cNvPr id="1" name=""/>
+        <p:cNvGrpSpPr/>
+        <p:nvPr/>
+      </p:nvGrpSpPr>
+      <p:grpSpPr>
+        <a:xfrm>
+          <a:off x="0" y="0"/>
+          <a:ext cx="0" cy="0"/>
+          <a:chOff x="0" y="0"/>
+          <a:chExt cx="0" cy="0"/>
+        </a:xfrm>
+      </p:grpSpPr>
+      <p:sp>
+        <p:nvSpPr>
+          <p:cNvPr id="2" name="Title 1"/>
+          <p:cNvSpPr>
+            <a:spLocks noGrp="1"/>
+          </p:cNvSpPr>
+          <p:nvPr>
+            <p:ph type="title"/>
+          </p:nvPr>
+        </p:nvSpPr>
+        <p:spPr/>
+        <p:txBody>
+          <a:bodyPr/>
+          <a:lstStyle/>
+          <a:p>
+            <a:r>
+              <a:rPr lang="en-GB" dirty="0" smtClean="0"/>
               <a:t>Place order activity diagram</a:t>
             </a:r>
             <a:endParaRPr lang="en-GB" dirty="0"/>
@@ -4767,7 +5375,7 @@
           <a:blip r:embed="rId2" cstate="print">
             <a:extLst>
               <a:ext uri="{28A0092B-C50C-407E-A947-70E740481C1C}">
-                <a14:useLocalDpi xmlns:a14="http://schemas.microsoft.com/office/drawing/2010/main" xmlns="" val="0"/>
+                <a14:useLocalDpi xmlns="" xmlns:a14="http://schemas.microsoft.com/office/drawing/2010/main" val="0"/>
               </a:ext>
             </a:extLst>
           </a:blip>
@@ -4785,7 +5393,7 @@
     </p:spTree>
     <p:extLst>
       <p:ext uri="{BB962C8B-B14F-4D97-AF65-F5344CB8AC3E}">
-        <p14:creationId xmlns:p14="http://schemas.microsoft.com/office/powerpoint/2010/main" xmlns="" val="3782763740"/>
+        <p14:creationId xmlns="" xmlns:p14="http://schemas.microsoft.com/office/powerpoint/2010/main" val="3782763740"/>
       </p:ext>
     </p:extLst>
   </p:cSld>

</xml_diff>